<commit_message>
finalized slides for troubleshooting
</commit_message>
<xml_diff>
--- a/08_getting_started_and_troubleshooting.pptx
+++ b/08_getting_started_and_troubleshooting.pptx
@@ -3589,7 +3589,7 @@
         <p:spPr>
           <a:xfrm>
             <a:off x="0" y="6560280"/>
-            <a:ext cx="12189960" cy="295560"/>
+            <a:ext cx="12189240" cy="294840"/>
           </a:xfrm>
           <a:prstGeom prst="rect">
             <a:avLst/>
@@ -3625,7 +3625,7 @@
         <p:spPr>
           <a:xfrm>
             <a:off x="0" y="0"/>
-            <a:ext cx="12189960" cy="619920"/>
+            <a:ext cx="12189240" cy="619200"/>
           </a:xfrm>
           <a:prstGeom prst="rect">
             <a:avLst/>
@@ -3661,7 +3661,7 @@
         <p:spPr>
           <a:xfrm>
             <a:off x="783000" y="60120"/>
-            <a:ext cx="6591600" cy="502200"/>
+            <a:ext cx="6590880" cy="501480"/>
           </a:xfrm>
           <a:prstGeom prst="rect">
             <a:avLst/>
@@ -3691,7 +3691,7 @@
         <p:spPr>
           <a:xfrm>
             <a:off x="11450880" y="6592320"/>
-            <a:ext cx="648720" cy="231480"/>
+            <a:ext cx="648000" cy="230760"/>
           </a:xfrm>
           <a:prstGeom prst="rect">
             <a:avLst/>
@@ -4020,7 +4020,7 @@
         <p:spPr>
           <a:xfrm>
             <a:off x="0" y="6560280"/>
-            <a:ext cx="12189960" cy="295560"/>
+            <a:ext cx="12189240" cy="294840"/>
           </a:xfrm>
           <a:prstGeom prst="rect">
             <a:avLst/>
@@ -4056,7 +4056,7 @@
         <p:spPr>
           <a:xfrm>
             <a:off x="0" y="0"/>
-            <a:ext cx="12189960" cy="619920"/>
+            <a:ext cx="12189240" cy="619200"/>
           </a:xfrm>
           <a:prstGeom prst="rect">
             <a:avLst/>
@@ -4092,7 +4092,7 @@
         <p:spPr>
           <a:xfrm>
             <a:off x="783000" y="60120"/>
-            <a:ext cx="6591600" cy="502200"/>
+            <a:ext cx="6590880" cy="501480"/>
           </a:xfrm>
           <a:prstGeom prst="rect">
             <a:avLst/>
@@ -4122,7 +4122,7 @@
         <p:spPr>
           <a:xfrm>
             <a:off x="11450880" y="6592320"/>
-            <a:ext cx="648720" cy="231480"/>
+            <a:ext cx="648000" cy="230760"/>
           </a:xfrm>
           <a:prstGeom prst="rect">
             <a:avLst/>
@@ -4448,7 +4448,7 @@
         <p:spPr>
           <a:xfrm>
             <a:off x="695160" y="3054600"/>
-            <a:ext cx="8904240" cy="493200"/>
+            <a:ext cx="8903520" cy="492480"/>
           </a:xfrm>
           <a:prstGeom prst="rect">
             <a:avLst/>
@@ -4524,7 +4524,7 @@
         <p:spPr>
           <a:xfrm>
             <a:off x="428760" y="71640"/>
-            <a:ext cx="10086480" cy="540720"/>
+            <a:ext cx="10085760" cy="540000"/>
           </a:xfrm>
           <a:prstGeom prst="rect">
             <a:avLst/>
@@ -4576,7 +4576,7 @@
         <p:spPr>
           <a:xfrm>
             <a:off x="457200" y="2057400"/>
-            <a:ext cx="4341960" cy="344880"/>
+            <a:ext cx="4341240" cy="344160"/>
           </a:xfrm>
           <a:prstGeom prst="rect">
             <a:avLst/>
@@ -4602,7 +4602,7 @@
         <p:spPr>
           <a:xfrm>
             <a:off x="457200" y="1277640"/>
-            <a:ext cx="10514160" cy="3487320"/>
+            <a:ext cx="10513440" cy="3486600"/>
           </a:xfrm>
           <a:prstGeom prst="rect">
             <a:avLst/>
@@ -4780,7 +4780,7 @@
         <p:spPr>
           <a:xfrm>
             <a:off x="428760" y="71640"/>
-            <a:ext cx="10086480" cy="540720"/>
+            <a:ext cx="10085760" cy="540000"/>
           </a:xfrm>
           <a:prstGeom prst="rect">
             <a:avLst/>
@@ -4832,7 +4832,7 @@
         <p:spPr>
           <a:xfrm>
             <a:off x="457200" y="2057400"/>
-            <a:ext cx="4341960" cy="344880"/>
+            <a:ext cx="4341240" cy="344160"/>
           </a:xfrm>
           <a:prstGeom prst="rect">
             <a:avLst/>
@@ -4858,7 +4858,7 @@
         <p:spPr>
           <a:xfrm>
             <a:off x="457200" y="1277640"/>
-            <a:ext cx="10514160" cy="3487320"/>
+            <a:ext cx="10513440" cy="3486600"/>
           </a:xfrm>
           <a:prstGeom prst="rect">
             <a:avLst/>
@@ -4886,7 +4886,7 @@
               <a:buNone/>
             </a:pPr>
             <a:r>
-              <a:rPr b="0" lang="en-US" sz="2400" spc="-1" strike="noStrike">
+              <a:rPr b="0" lang="en-US" sz="2200" spc="-1" strike="noStrike">
                 <a:solidFill>
                   <a:srgbClr val="000000"/>
                 </a:solidFill>
@@ -4895,30 +4895,30 @@
               </a:rPr>
               <a:t>Ideally, the project brings together skills you’ve learned in the program.</a:t>
             </a:r>
-            <a:endParaRPr b="0" lang="en-US" sz="2400" spc="-1" strike="noStrike">
-              <a:latin typeface="Arial"/>
-            </a:endParaRPr>
-          </a:p>
-          <a:p>
-            <a:pPr>
-              <a:lnSpc>
-                <a:spcPct val="100000"/>
-              </a:lnSpc>
-              <a:buNone/>
-            </a:pPr>
-            <a:endParaRPr b="0" lang="en-US" sz="2400" spc="-1" strike="noStrike">
-              <a:latin typeface="Arial"/>
-            </a:endParaRPr>
-          </a:p>
-          <a:p>
-            <a:pPr>
-              <a:lnSpc>
-                <a:spcPct val="100000"/>
-              </a:lnSpc>
-              <a:buNone/>
-            </a:pPr>
-            <a:r>
-              <a:rPr b="1" lang="en-US" sz="2400" spc="-1" strike="noStrike">
+            <a:endParaRPr b="0" lang="en-US" sz="2200" spc="-1" strike="noStrike">
+              <a:latin typeface="Arial"/>
+            </a:endParaRPr>
+          </a:p>
+          <a:p>
+            <a:pPr>
+              <a:lnSpc>
+                <a:spcPct val="100000"/>
+              </a:lnSpc>
+              <a:buNone/>
+            </a:pPr>
+            <a:endParaRPr b="0" lang="en-US" sz="2200" spc="-1" strike="noStrike">
+              <a:latin typeface="Arial"/>
+            </a:endParaRPr>
+          </a:p>
+          <a:p>
+            <a:pPr>
+              <a:lnSpc>
+                <a:spcPct val="100000"/>
+              </a:lnSpc>
+              <a:buNone/>
+            </a:pPr>
+            <a:r>
+              <a:rPr b="1" lang="en-US" sz="2200" spc="-1" strike="noStrike">
                 <a:solidFill>
                   <a:srgbClr val="000000"/>
                 </a:solidFill>
@@ -4927,30 +4927,30 @@
               </a:rPr>
               <a:t>Q: What if I don’t have the skills to solve the problem?</a:t>
             </a:r>
-            <a:endParaRPr b="0" lang="en-US" sz="2400" spc="-1" strike="noStrike">
-              <a:latin typeface="Arial"/>
-            </a:endParaRPr>
-          </a:p>
-          <a:p>
-            <a:pPr>
-              <a:lnSpc>
-                <a:spcPct val="100000"/>
-              </a:lnSpc>
-              <a:buNone/>
-            </a:pPr>
-            <a:endParaRPr b="0" lang="en-US" sz="2400" spc="-1" strike="noStrike">
-              <a:latin typeface="Arial"/>
-            </a:endParaRPr>
-          </a:p>
-          <a:p>
-            <a:pPr>
-              <a:lnSpc>
-                <a:spcPct val="100000"/>
-              </a:lnSpc>
-              <a:buNone/>
-            </a:pPr>
-            <a:r>
-              <a:rPr b="0" lang="en-US" sz="2400" spc="-1" strike="noStrike">
+            <a:endParaRPr b="0" lang="en-US" sz="2200" spc="-1" strike="noStrike">
+              <a:latin typeface="Arial"/>
+            </a:endParaRPr>
+          </a:p>
+          <a:p>
+            <a:pPr>
+              <a:lnSpc>
+                <a:spcPct val="100000"/>
+              </a:lnSpc>
+              <a:buNone/>
+            </a:pPr>
+            <a:endParaRPr b="0" lang="en-US" sz="2200" spc="-1" strike="noStrike">
+              <a:latin typeface="Arial"/>
+            </a:endParaRPr>
+          </a:p>
+          <a:p>
+            <a:pPr>
+              <a:lnSpc>
+                <a:spcPct val="100000"/>
+              </a:lnSpc>
+              <a:buNone/>
+            </a:pPr>
+            <a:r>
+              <a:rPr b="0" lang="en-US" sz="2200" spc="-1" strike="noStrike">
                 <a:solidFill>
                   <a:srgbClr val="000000"/>
                 </a:solidFill>
@@ -4959,19 +4959,19 @@
               </a:rPr>
               <a:t>&gt; In some cases, you will need to learn new things</a:t>
             </a:r>
-            <a:endParaRPr b="0" lang="en-US" sz="2400" spc="-1" strike="noStrike">
-              <a:latin typeface="Arial"/>
-            </a:endParaRPr>
-          </a:p>
-          <a:p>
-            <a:pPr>
-              <a:lnSpc>
-                <a:spcPct val="100000"/>
-              </a:lnSpc>
-              <a:buNone/>
-            </a:pPr>
-            <a:r>
-              <a:rPr b="0" lang="en-US" sz="2400" spc="-1" strike="noStrike">
+            <a:endParaRPr b="0" lang="en-US" sz="2200" spc="-1" strike="noStrike">
+              <a:latin typeface="Arial"/>
+            </a:endParaRPr>
+          </a:p>
+          <a:p>
+            <a:pPr>
+              <a:lnSpc>
+                <a:spcPct val="100000"/>
+              </a:lnSpc>
+              <a:buNone/>
+            </a:pPr>
+            <a:r>
+              <a:rPr b="0" lang="en-US" sz="2200" spc="-1" strike="noStrike">
                 <a:solidFill>
                   <a:srgbClr val="000000"/>
                 </a:solidFill>
@@ -4981,21 +4981,21 @@
               <a:t>&gt; Your sponsor / mentor might be able to suggest resources</a:t>
             </a:r>
             <a:br>
-              <a:rPr sz="2400"/>
+              <a:rPr sz="2200"/>
             </a:br>
-            <a:endParaRPr b="0" lang="en-US" sz="2400" spc="-1" strike="noStrike">
-              <a:latin typeface="Arial"/>
-            </a:endParaRPr>
-          </a:p>
-          <a:p>
-            <a:pPr>
-              <a:lnSpc>
-                <a:spcPct val="100000"/>
-              </a:lnSpc>
-              <a:buNone/>
-            </a:pPr>
-            <a:r>
-              <a:rPr b="0" lang="en-US" sz="2400" spc="-1" strike="noStrike">
+            <a:endParaRPr b="0" lang="en-US" sz="2200" spc="-1" strike="noStrike">
+              <a:latin typeface="Arial"/>
+            </a:endParaRPr>
+          </a:p>
+          <a:p>
+            <a:pPr>
+              <a:lnSpc>
+                <a:spcPct val="100000"/>
+              </a:lnSpc>
+              <a:buNone/>
+            </a:pPr>
+            <a:r>
+              <a:rPr b="0" lang="en-US" sz="2200" spc="-1" strike="noStrike">
                 <a:solidFill>
                   <a:srgbClr val="000000"/>
                 </a:solidFill>
@@ -5004,19 +5004,19 @@
               </a:rPr>
               <a:t>&gt; Keep a list of open questions, skills needed</a:t>
             </a:r>
-            <a:endParaRPr b="0" lang="en-US" sz="2400" spc="-1" strike="noStrike">
-              <a:latin typeface="Arial"/>
-            </a:endParaRPr>
-          </a:p>
-          <a:p>
-            <a:pPr>
-              <a:lnSpc>
-                <a:spcPct val="100000"/>
-              </a:lnSpc>
-              <a:buNone/>
-            </a:pPr>
-            <a:r>
-              <a:rPr b="0" lang="en-US" sz="2400" spc="-1" strike="noStrike">
+            <a:endParaRPr b="0" lang="en-US" sz="2200" spc="-1" strike="noStrike">
+              <a:latin typeface="Arial"/>
+            </a:endParaRPr>
+          </a:p>
+          <a:p>
+            <a:pPr>
+              <a:lnSpc>
+                <a:spcPct val="100000"/>
+              </a:lnSpc>
+              <a:buNone/>
+            </a:pPr>
+            <a:r>
+              <a:rPr b="0" lang="en-US" sz="2200" spc="-1" strike="noStrike">
                 <a:solidFill>
                   <a:srgbClr val="000000"/>
                 </a:solidFill>
@@ -5026,7 +5026,7 @@
               <a:t>   </a:t>
             </a:r>
             <a:r>
-              <a:rPr b="0" lang="en-US" sz="2400" spc="-1" strike="noStrike">
+              <a:rPr b="0" lang="en-US" sz="2200" spc="-1" strike="noStrike">
                 <a:solidFill>
                   <a:srgbClr val="000000"/>
                 </a:solidFill>
@@ -5035,19 +5035,19 @@
               </a:rPr>
               <a:t>Break these down into manageable tasks (e.g., learn n-gram models)</a:t>
             </a:r>
-            <a:endParaRPr b="0" lang="en-US" sz="2400" spc="-1" strike="noStrike">
-              <a:latin typeface="Arial"/>
-            </a:endParaRPr>
-          </a:p>
-          <a:p>
-            <a:pPr>
-              <a:lnSpc>
-                <a:spcPct val="100000"/>
-              </a:lnSpc>
-              <a:buNone/>
-            </a:pPr>
-            <a:r>
-              <a:rPr b="0" lang="en-US" sz="2400" spc="-1" strike="noStrike">
+            <a:endParaRPr b="0" lang="en-US" sz="2200" spc="-1" strike="noStrike">
+              <a:latin typeface="Arial"/>
+            </a:endParaRPr>
+          </a:p>
+          <a:p>
+            <a:pPr>
+              <a:lnSpc>
+                <a:spcPct val="100000"/>
+              </a:lnSpc>
+              <a:buNone/>
+            </a:pPr>
+            <a:r>
+              <a:rPr b="0" lang="en-US" sz="2200" spc="-1" strike="noStrike">
                 <a:solidFill>
                   <a:srgbClr val="000000"/>
                 </a:solidFill>
@@ -5057,7 +5057,7 @@
               <a:t>&gt; You might distribute the work across teammates and share learnings</a:t>
             </a:r>
             <a:r>
-              <a:rPr b="0" lang="en-US" sz="1800" spc="-1" strike="noStrike">
+              <a:rPr b="0" lang="en-US" sz="2200" spc="-1" strike="noStrike">
                 <a:solidFill>
                   <a:srgbClr val="000000"/>
                 </a:solidFill>
@@ -5066,18 +5066,18 @@
               </a:rPr>
               <a:t> </a:t>
             </a:r>
-            <a:endParaRPr b="0" lang="en-US" sz="1800" spc="-1" strike="noStrike">
-              <a:latin typeface="Arial"/>
-            </a:endParaRPr>
-          </a:p>
-          <a:p>
-            <a:pPr>
-              <a:lnSpc>
-                <a:spcPct val="100000"/>
-              </a:lnSpc>
-              <a:buNone/>
-            </a:pPr>
-            <a:endParaRPr b="0" lang="en-US" sz="2400" spc="-1" strike="noStrike">
+            <a:endParaRPr b="0" lang="en-US" sz="2200" spc="-1" strike="noStrike">
+              <a:latin typeface="Arial"/>
+            </a:endParaRPr>
+          </a:p>
+          <a:p>
+            <a:pPr>
+              <a:lnSpc>
+                <a:spcPct val="100000"/>
+              </a:lnSpc>
+              <a:buNone/>
+            </a:pPr>
+            <a:endParaRPr b="0" lang="en-US" sz="2200" spc="-1" strike="noStrike">
               <a:latin typeface="Arial"/>
             </a:endParaRPr>
           </a:p>
@@ -5122,7 +5122,7 @@
         <p:spPr>
           <a:xfrm>
             <a:off x="428760" y="71640"/>
-            <a:ext cx="10086480" cy="540720"/>
+            <a:ext cx="10085760" cy="540000"/>
           </a:xfrm>
           <a:prstGeom prst="rect">
             <a:avLst/>
@@ -5174,7 +5174,7 @@
         <p:spPr>
           <a:xfrm>
             <a:off x="457200" y="2057400"/>
-            <a:ext cx="4341960" cy="344880"/>
+            <a:ext cx="4341240" cy="344160"/>
           </a:xfrm>
           <a:prstGeom prst="rect">
             <a:avLst/>
@@ -5200,7 +5200,7 @@
         <p:spPr>
           <a:xfrm>
             <a:off x="457200" y="1277640"/>
-            <a:ext cx="11430000" cy="3487320"/>
+            <a:ext cx="11429280" cy="3486600"/>
           </a:xfrm>
           <a:prstGeom prst="rect">
             <a:avLst/>
@@ -5373,7 +5373,20 @@
                 <a:latin typeface="Arial"/>
                 <a:ea typeface="DejaVu Sans"/>
               </a:rPr>
-              <a:t>   - Are things summarized? (e.g., assemble separate questions into single slide)</a:t>
+              <a:t>   - Are things summarized? </a:t>
+            </a:r>
+            <a:br>
+              <a:rPr sz="2400"/>
+            </a:br>
+            <a:r>
+              <a:rPr b="0" lang="en-US" sz="2400" spc="-1" strike="noStrike">
+                <a:solidFill>
+                  <a:srgbClr val="000000"/>
+                </a:solidFill>
+                <a:latin typeface="Arial"/>
+                <a:ea typeface="DejaVu Sans"/>
+              </a:rPr>
+              <a:t>    (e.g., assemble separate questions into single slide)</a:t>
             </a:r>
             <a:endParaRPr b="0" lang="en-US" sz="2400" spc="-1" strike="noStrike">
               <a:latin typeface="Arial"/>
@@ -5420,7 +5433,7 @@
         <p:spPr>
           <a:xfrm>
             <a:off x="428760" y="71640"/>
-            <a:ext cx="10086480" cy="540720"/>
+            <a:ext cx="10085760" cy="540000"/>
           </a:xfrm>
           <a:prstGeom prst="rect">
             <a:avLst/>
@@ -5472,7 +5485,7 @@
         <p:spPr>
           <a:xfrm>
             <a:off x="457200" y="2057400"/>
-            <a:ext cx="4341960" cy="344880"/>
+            <a:ext cx="4341240" cy="344160"/>
           </a:xfrm>
           <a:prstGeom prst="rect">
             <a:avLst/>
@@ -5498,7 +5511,7 @@
         <p:spPr>
           <a:xfrm>
             <a:off x="457200" y="1277640"/>
-            <a:ext cx="11430000" cy="3487320"/>
+            <a:ext cx="11429280" cy="3486600"/>
           </a:xfrm>
           <a:prstGeom prst="rect">
             <a:avLst/>
@@ -5703,7 +5716,7 @@
         <p:spPr>
           <a:xfrm>
             <a:off x="428760" y="71640"/>
-            <a:ext cx="10086480" cy="540720"/>
+            <a:ext cx="10085760" cy="540000"/>
           </a:xfrm>
           <a:prstGeom prst="rect">
             <a:avLst/>
@@ -5755,7 +5768,7 @@
         <p:spPr>
           <a:xfrm>
             <a:off x="457200" y="2057400"/>
-            <a:ext cx="4341960" cy="344880"/>
+            <a:ext cx="4341240" cy="344160"/>
           </a:xfrm>
           <a:prstGeom prst="rect">
             <a:avLst/>
@@ -5781,7 +5794,7 @@
         <p:spPr>
           <a:xfrm>
             <a:off x="457200" y="1277640"/>
-            <a:ext cx="10514160" cy="3487320"/>
+            <a:ext cx="10513440" cy="3486600"/>
           </a:xfrm>
           <a:prstGeom prst="rect">
             <a:avLst/>
@@ -6021,7 +6034,7 @@
         <p:spPr>
           <a:xfrm>
             <a:off x="428760" y="71640"/>
-            <a:ext cx="10086480" cy="540720"/>
+            <a:ext cx="10085760" cy="540000"/>
           </a:xfrm>
           <a:prstGeom prst="rect">
             <a:avLst/>
@@ -6073,7 +6086,7 @@
         <p:spPr>
           <a:xfrm>
             <a:off x="457200" y="2057400"/>
-            <a:ext cx="4341960" cy="344880"/>
+            <a:ext cx="4341240" cy="344160"/>
           </a:xfrm>
           <a:prstGeom prst="rect">
             <a:avLst/>
@@ -6099,7 +6112,7 @@
         <p:spPr>
           <a:xfrm>
             <a:off x="457200" y="1277640"/>
-            <a:ext cx="10514160" cy="3487320"/>
+            <a:ext cx="10513440" cy="3486600"/>
           </a:xfrm>
           <a:prstGeom prst="rect">
             <a:avLst/>
@@ -6127,7 +6140,7 @@
               <a:buNone/>
             </a:pPr>
             <a:r>
-              <a:rPr b="0" lang="en-US" sz="2400" spc="-1" strike="noStrike">
+              <a:rPr b="0" lang="en-US" sz="2200" spc="-1" strike="noStrike">
                 <a:solidFill>
                   <a:srgbClr val="000000"/>
                 </a:solidFill>
@@ -6136,19 +6149,19 @@
               </a:rPr>
               <a:t>You’ve built a model</a:t>
             </a:r>
-            <a:endParaRPr b="0" lang="en-US" sz="2400" spc="-1" strike="noStrike">
-              <a:latin typeface="Arial"/>
-            </a:endParaRPr>
-          </a:p>
-          <a:p>
-            <a:pPr>
-              <a:lnSpc>
-                <a:spcPct val="100000"/>
-              </a:lnSpc>
-              <a:buNone/>
-            </a:pPr>
-            <a:r>
-              <a:rPr b="0" lang="en-US" sz="2400" spc="-1" strike="noStrike">
+            <a:endParaRPr b="0" lang="en-US" sz="2200" spc="-1" strike="noStrike">
+              <a:latin typeface="Arial"/>
+            </a:endParaRPr>
+          </a:p>
+          <a:p>
+            <a:pPr>
+              <a:lnSpc>
+                <a:spcPct val="100000"/>
+              </a:lnSpc>
+              <a:buNone/>
+            </a:pPr>
+            <a:r>
+              <a:rPr b="0" lang="en-US" sz="2200" spc="-1" strike="noStrike">
                 <a:solidFill>
                   <a:srgbClr val="000000"/>
                 </a:solidFill>
@@ -6157,30 +6170,30 @@
               </a:rPr>
               <a:t>When you change hyperparameters slightly, the results change drastically</a:t>
             </a:r>
-            <a:endParaRPr b="0" lang="en-US" sz="2400" spc="-1" strike="noStrike">
-              <a:latin typeface="Arial"/>
-            </a:endParaRPr>
-          </a:p>
-          <a:p>
-            <a:pPr>
-              <a:lnSpc>
-                <a:spcPct val="100000"/>
-              </a:lnSpc>
-              <a:buNone/>
-            </a:pPr>
-            <a:endParaRPr b="0" lang="en-US" sz="2400" spc="-1" strike="noStrike">
-              <a:latin typeface="Arial"/>
-            </a:endParaRPr>
-          </a:p>
-          <a:p>
-            <a:pPr>
-              <a:lnSpc>
-                <a:spcPct val="100000"/>
-              </a:lnSpc>
-              <a:buNone/>
-            </a:pPr>
-            <a:r>
-              <a:rPr b="1" lang="en-US" sz="2400" spc="-1" strike="noStrike">
+            <a:endParaRPr b="0" lang="en-US" sz="2200" spc="-1" strike="noStrike">
+              <a:latin typeface="Arial"/>
+            </a:endParaRPr>
+          </a:p>
+          <a:p>
+            <a:pPr>
+              <a:lnSpc>
+                <a:spcPct val="100000"/>
+              </a:lnSpc>
+              <a:buNone/>
+            </a:pPr>
+            <a:endParaRPr b="0" lang="en-US" sz="2200" spc="-1" strike="noStrike">
+              <a:latin typeface="Arial"/>
+            </a:endParaRPr>
+          </a:p>
+          <a:p>
+            <a:pPr>
+              <a:lnSpc>
+                <a:spcPct val="100000"/>
+              </a:lnSpc>
+              <a:buNone/>
+            </a:pPr>
+            <a:r>
+              <a:rPr b="1" lang="en-US" sz="2200" spc="-1" strike="noStrike">
                 <a:solidFill>
                   <a:srgbClr val="000000"/>
                 </a:solidFill>
@@ -6189,30 +6202,30 @@
               </a:rPr>
               <a:t>Q: Why is my model so unstable?</a:t>
             </a:r>
-            <a:endParaRPr b="0" lang="en-US" sz="2400" spc="-1" strike="noStrike">
-              <a:latin typeface="Arial"/>
-            </a:endParaRPr>
-          </a:p>
-          <a:p>
-            <a:pPr>
-              <a:lnSpc>
-                <a:spcPct val="100000"/>
-              </a:lnSpc>
-              <a:buNone/>
-            </a:pPr>
-            <a:endParaRPr b="0" lang="en-US" sz="2400" spc="-1" strike="noStrike">
-              <a:latin typeface="Arial"/>
-            </a:endParaRPr>
-          </a:p>
-          <a:p>
-            <a:pPr>
-              <a:lnSpc>
-                <a:spcPct val="100000"/>
-              </a:lnSpc>
-              <a:buNone/>
-            </a:pPr>
-            <a:r>
-              <a:rPr b="0" lang="en-US" sz="2400" spc="-1" strike="noStrike">
+            <a:endParaRPr b="0" lang="en-US" sz="2200" spc="-1" strike="noStrike">
+              <a:latin typeface="Arial"/>
+            </a:endParaRPr>
+          </a:p>
+          <a:p>
+            <a:pPr>
+              <a:lnSpc>
+                <a:spcPct val="100000"/>
+              </a:lnSpc>
+              <a:buNone/>
+            </a:pPr>
+            <a:endParaRPr b="0" lang="en-US" sz="2200" spc="-1" strike="noStrike">
+              <a:latin typeface="Arial"/>
+            </a:endParaRPr>
+          </a:p>
+          <a:p>
+            <a:pPr>
+              <a:lnSpc>
+                <a:spcPct val="100000"/>
+              </a:lnSpc>
+              <a:buNone/>
+            </a:pPr>
+            <a:r>
+              <a:rPr b="0" lang="en-US" sz="2200" spc="-1" strike="noStrike">
                 <a:solidFill>
                   <a:srgbClr val="000000"/>
                 </a:solidFill>
@@ -6221,51 +6234,51 @@
               </a:rPr>
               <a:t>While we tune models for better performance,</a:t>
             </a:r>
-            <a:endParaRPr b="0" lang="en-US" sz="2400" spc="-1" strike="noStrike">
-              <a:latin typeface="Arial"/>
-            </a:endParaRPr>
-          </a:p>
-          <a:p>
-            <a:pPr>
-              <a:lnSpc>
-                <a:spcPct val="100000"/>
-              </a:lnSpc>
-              <a:buNone/>
-            </a:pPr>
-            <a:r>
-              <a:rPr b="0" lang="en-US" sz="2400" spc="-1" strike="noStrike">
-                <a:solidFill>
-                  <a:srgbClr val="000000"/>
-                </a:solidFill>
-                <a:latin typeface="Arial"/>
-                <a:ea typeface="DejaVu Sans"/>
-              </a:rPr>
-              <a:t>a drastic change in output is not desireable</a:t>
-            </a:r>
-            <a:endParaRPr b="0" lang="en-US" sz="2400" spc="-1" strike="noStrike">
-              <a:latin typeface="Arial"/>
-            </a:endParaRPr>
-          </a:p>
-          <a:p>
-            <a:pPr>
-              <a:lnSpc>
-                <a:spcPct val="100000"/>
-              </a:lnSpc>
-              <a:buNone/>
-            </a:pPr>
-            <a:endParaRPr b="0" lang="en-US" sz="2400" spc="-1" strike="noStrike">
-              <a:latin typeface="Arial"/>
-            </a:endParaRPr>
-          </a:p>
-          <a:p>
-            <a:pPr>
-              <a:lnSpc>
-                <a:spcPct val="100000"/>
-              </a:lnSpc>
-              <a:buNone/>
-            </a:pPr>
-            <a:r>
-              <a:rPr b="0" lang="en-US" sz="2400" spc="-1" strike="noStrike">
+            <a:endParaRPr b="0" lang="en-US" sz="2200" spc="-1" strike="noStrike">
+              <a:latin typeface="Arial"/>
+            </a:endParaRPr>
+          </a:p>
+          <a:p>
+            <a:pPr>
+              <a:lnSpc>
+                <a:spcPct val="100000"/>
+              </a:lnSpc>
+              <a:buNone/>
+            </a:pPr>
+            <a:r>
+              <a:rPr b="0" lang="en-US" sz="2200" spc="-1" strike="noStrike">
+                <a:solidFill>
+                  <a:srgbClr val="000000"/>
+                </a:solidFill>
+                <a:latin typeface="Arial"/>
+                <a:ea typeface="DejaVu Sans"/>
+              </a:rPr>
+              <a:t>a drastic change in output is not desirable</a:t>
+            </a:r>
+            <a:endParaRPr b="0" lang="en-US" sz="2200" spc="-1" strike="noStrike">
+              <a:latin typeface="Arial"/>
+            </a:endParaRPr>
+          </a:p>
+          <a:p>
+            <a:pPr>
+              <a:lnSpc>
+                <a:spcPct val="100000"/>
+              </a:lnSpc>
+              <a:buNone/>
+            </a:pPr>
+            <a:endParaRPr b="0" lang="en-US" sz="2200" spc="-1" strike="noStrike">
+              <a:latin typeface="Arial"/>
+            </a:endParaRPr>
+          </a:p>
+          <a:p>
+            <a:pPr>
+              <a:lnSpc>
+                <a:spcPct val="100000"/>
+              </a:lnSpc>
+              <a:buNone/>
+            </a:pPr>
+            <a:r>
+              <a:rPr b="0" lang="en-US" sz="2200" spc="-1" strike="noStrike">
                 <a:solidFill>
                   <a:srgbClr val="000000"/>
                 </a:solidFill>
@@ -6274,19 +6287,19 @@
               </a:rPr>
               <a:t>&gt; The model may be too complex</a:t>
             </a:r>
-            <a:endParaRPr b="0" lang="en-US" sz="2400" spc="-1" strike="noStrike">
-              <a:latin typeface="Arial"/>
-            </a:endParaRPr>
-          </a:p>
-          <a:p>
-            <a:pPr>
-              <a:lnSpc>
-                <a:spcPct val="100000"/>
-              </a:lnSpc>
-              <a:buNone/>
-            </a:pPr>
-            <a:r>
-              <a:rPr b="0" lang="en-US" sz="2400" spc="-1" strike="noStrike">
+            <a:endParaRPr b="0" lang="en-US" sz="2200" spc="-1" strike="noStrike">
+              <a:latin typeface="Arial"/>
+            </a:endParaRPr>
+          </a:p>
+          <a:p>
+            <a:pPr>
+              <a:lnSpc>
+                <a:spcPct val="100000"/>
+              </a:lnSpc>
+              <a:buNone/>
+            </a:pPr>
+            <a:r>
+              <a:rPr b="0" lang="en-US" sz="2200" spc="-1" strike="noStrike">
                 <a:solidFill>
                   <a:srgbClr val="000000"/>
                 </a:solidFill>
@@ -6295,30 +6308,30 @@
               </a:rPr>
               <a:t>Can try simpler model and examine sensitivity</a:t>
             </a:r>
-            <a:endParaRPr b="0" lang="en-US" sz="2400" spc="-1" strike="noStrike">
-              <a:latin typeface="Arial"/>
-            </a:endParaRPr>
-          </a:p>
-          <a:p>
-            <a:pPr>
-              <a:lnSpc>
-                <a:spcPct val="100000"/>
-              </a:lnSpc>
-              <a:buNone/>
-            </a:pPr>
-            <a:endParaRPr b="0" lang="en-US" sz="2400" spc="-1" strike="noStrike">
-              <a:latin typeface="Arial"/>
-            </a:endParaRPr>
-          </a:p>
-          <a:p>
-            <a:pPr>
-              <a:lnSpc>
-                <a:spcPct val="100000"/>
-              </a:lnSpc>
-              <a:buNone/>
-            </a:pPr>
-            <a:r>
-              <a:rPr b="0" lang="en-US" sz="2400" spc="-1" strike="noStrike">
+            <a:endParaRPr b="0" lang="en-US" sz="2200" spc="-1" strike="noStrike">
+              <a:latin typeface="Arial"/>
+            </a:endParaRPr>
+          </a:p>
+          <a:p>
+            <a:pPr>
+              <a:lnSpc>
+                <a:spcPct val="100000"/>
+              </a:lnSpc>
+              <a:buNone/>
+            </a:pPr>
+            <a:endParaRPr b="0" lang="en-US" sz="2200" spc="-1" strike="noStrike">
+              <a:latin typeface="Arial"/>
+            </a:endParaRPr>
+          </a:p>
+          <a:p>
+            <a:pPr>
+              <a:lnSpc>
+                <a:spcPct val="100000"/>
+              </a:lnSpc>
+              <a:buNone/>
+            </a:pPr>
+            <a:r>
+              <a:rPr b="0" lang="en-US" sz="2200" spc="-1" strike="noStrike">
                 <a:solidFill>
                   <a:srgbClr val="000000"/>
                 </a:solidFill>
@@ -6327,7 +6340,7 @@
               </a:rPr>
               <a:t>&gt; Did you cross validate the model? This is a good practice when feasible</a:t>
             </a:r>
-            <a:endParaRPr b="0" lang="en-US" sz="2400" spc="-1" strike="noStrike">
+            <a:endParaRPr b="0" lang="en-US" sz="2200" spc="-1" strike="noStrike">
               <a:latin typeface="Arial"/>
             </a:endParaRPr>
           </a:p>
@@ -6372,7 +6385,7 @@
         <p:spPr>
           <a:xfrm>
             <a:off x="428760" y="71640"/>
-            <a:ext cx="10086480" cy="540720"/>
+            <a:ext cx="10085760" cy="540000"/>
           </a:xfrm>
           <a:prstGeom prst="rect">
             <a:avLst/>
@@ -6424,7 +6437,7 @@
         <p:spPr>
           <a:xfrm>
             <a:off x="457200" y="2057400"/>
-            <a:ext cx="4341960" cy="344880"/>
+            <a:ext cx="4341240" cy="344160"/>
           </a:xfrm>
           <a:prstGeom prst="rect">
             <a:avLst/>
@@ -6450,7 +6463,7 @@
         <p:spPr>
           <a:xfrm>
             <a:off x="457200" y="1277640"/>
-            <a:ext cx="10514160" cy="3487320"/>
+            <a:ext cx="10513440" cy="3486600"/>
           </a:xfrm>
           <a:prstGeom prst="rect">
             <a:avLst/>
@@ -6617,7 +6630,7 @@
                 <a:latin typeface="Arial"/>
                 <a:ea typeface="DejaVu Sans"/>
               </a:rPr>
-              <a:t>Please lean on that system for help!</a:t>
+              <a:t>Please lean on this system for help!</a:t>
             </a:r>
             <a:endParaRPr b="0" lang="en-US" sz="2400" spc="-1" strike="noStrike">
               <a:latin typeface="Arial"/>
@@ -6686,7 +6699,7 @@
         <p:spPr>
           <a:xfrm>
             <a:off x="428760" y="71640"/>
-            <a:ext cx="6428880" cy="540720"/>
+            <a:ext cx="6428160" cy="540000"/>
           </a:xfrm>
           <a:prstGeom prst="rect">
             <a:avLst/>
@@ -6738,7 +6751,7 @@
         <p:spPr>
           <a:xfrm>
             <a:off x="457200" y="2057400"/>
-            <a:ext cx="4341960" cy="344880"/>
+            <a:ext cx="4341240" cy="344160"/>
           </a:xfrm>
           <a:prstGeom prst="rect">
             <a:avLst/>
@@ -6764,7 +6777,7 @@
         <p:spPr>
           <a:xfrm>
             <a:off x="457200" y="1673640"/>
-            <a:ext cx="10514160" cy="3487320"/>
+            <a:ext cx="10513440" cy="3486600"/>
           </a:xfrm>
           <a:prstGeom prst="rect">
             <a:avLst/>
@@ -6921,7 +6934,7 @@
         <p:spPr>
           <a:xfrm>
             <a:off x="428760" y="71640"/>
-            <a:ext cx="10086480" cy="540720"/>
+            <a:ext cx="10085760" cy="540000"/>
           </a:xfrm>
           <a:prstGeom prst="rect">
             <a:avLst/>
@@ -6973,7 +6986,7 @@
         <p:spPr>
           <a:xfrm>
             <a:off x="457200" y="2057400"/>
-            <a:ext cx="4341960" cy="344880"/>
+            <a:ext cx="4341240" cy="344160"/>
           </a:xfrm>
           <a:prstGeom prst="rect">
             <a:avLst/>
@@ -6999,7 +7012,7 @@
         <p:spPr>
           <a:xfrm>
             <a:off x="457200" y="1277640"/>
-            <a:ext cx="10514160" cy="3487320"/>
+            <a:ext cx="10513440" cy="3486600"/>
           </a:xfrm>
           <a:prstGeom prst="rect">
             <a:avLst/>
@@ -7185,7 +7198,7 @@
         <p:spPr>
           <a:xfrm>
             <a:off x="428760" y="71640"/>
-            <a:ext cx="10086480" cy="540720"/>
+            <a:ext cx="10085760" cy="540000"/>
           </a:xfrm>
           <a:prstGeom prst="rect">
             <a:avLst/>
@@ -7237,7 +7250,7 @@
         <p:spPr>
           <a:xfrm>
             <a:off x="457200" y="2057400"/>
-            <a:ext cx="4341960" cy="344880"/>
+            <a:ext cx="4341240" cy="344160"/>
           </a:xfrm>
           <a:prstGeom prst="rect">
             <a:avLst/>
@@ -7263,7 +7276,7 @@
         <p:spPr>
           <a:xfrm>
             <a:off x="457200" y="1277640"/>
-            <a:ext cx="10514160" cy="3487320"/>
+            <a:ext cx="10513440" cy="3486600"/>
           </a:xfrm>
           <a:prstGeom prst="rect">
             <a:avLst/>
@@ -7342,7 +7355,38 @@
                 <a:latin typeface="Arial"/>
                 <a:ea typeface="DejaVu Sans"/>
               </a:rPr>
-              <a:t>&gt; What needs to happen? (build lists, embed objects, build classifier, …)</a:t>
+              <a:t>&gt; What needs to happen? (build lists, embed objects, </a:t>
+            </a:r>
+            <a:endParaRPr b="0" lang="en-US" sz="2400" spc="-1" strike="noStrike">
+              <a:latin typeface="Arial"/>
+            </a:endParaRPr>
+          </a:p>
+          <a:p>
+            <a:pPr>
+              <a:lnSpc>
+                <a:spcPct val="100000"/>
+              </a:lnSpc>
+              <a:buNone/>
+            </a:pPr>
+            <a:r>
+              <a:rPr b="0" lang="en-US" sz="2400" spc="-1" strike="noStrike">
+                <a:solidFill>
+                  <a:srgbClr val="000000"/>
+                </a:solidFill>
+                <a:latin typeface="Arial"/>
+                <a:ea typeface="DejaVu Sans"/>
+              </a:rPr>
+              <a:t>     </a:t>
+            </a:r>
+            <a:r>
+              <a:rPr b="0" lang="en-US" sz="2400" spc="-1" strike="noStrike">
+                <a:solidFill>
+                  <a:srgbClr val="000000"/>
+                </a:solidFill>
+                <a:latin typeface="Arial"/>
+                <a:ea typeface="DejaVu Sans"/>
+              </a:rPr>
+              <a:t>build classifier, …)</a:t>
             </a:r>
             <a:endParaRPr b="0" lang="en-US" sz="2400" spc="-1" strike="noStrike">
               <a:latin typeface="Arial"/>
@@ -7509,7 +7553,7 @@
         <p:spPr>
           <a:xfrm>
             <a:off x="428760" y="71640"/>
-            <a:ext cx="10086480" cy="540720"/>
+            <a:ext cx="10085760" cy="540000"/>
           </a:xfrm>
           <a:prstGeom prst="rect">
             <a:avLst/>
@@ -7561,7 +7605,7 @@
         <p:spPr>
           <a:xfrm>
             <a:off x="457200" y="2057400"/>
-            <a:ext cx="4341960" cy="344880"/>
+            <a:ext cx="4341240" cy="344160"/>
           </a:xfrm>
           <a:prstGeom prst="rect">
             <a:avLst/>
@@ -7587,7 +7631,7 @@
         <p:spPr>
           <a:xfrm>
             <a:off x="457200" y="1277640"/>
-            <a:ext cx="10514160" cy="3487320"/>
+            <a:ext cx="10513440" cy="3486600"/>
           </a:xfrm>
           <a:prstGeom prst="rect">
             <a:avLst/>
@@ -7763,7 +7807,7 @@
         <p:spPr>
           <a:xfrm>
             <a:off x="428760" y="2807640"/>
-            <a:ext cx="11229480" cy="540720"/>
+            <a:ext cx="11228760" cy="540000"/>
           </a:xfrm>
           <a:prstGeom prst="rect">
             <a:avLst/>
@@ -7858,7 +7902,7 @@
         <p:spPr>
           <a:xfrm>
             <a:off x="457200" y="2057400"/>
-            <a:ext cx="4341960" cy="344880"/>
+            <a:ext cx="4341240" cy="344160"/>
           </a:xfrm>
           <a:prstGeom prst="rect">
             <a:avLst/>
@@ -7914,7 +7958,7 @@
         <p:spPr>
           <a:xfrm>
             <a:off x="428760" y="71640"/>
-            <a:ext cx="10086480" cy="540720"/>
+            <a:ext cx="10085760" cy="540000"/>
           </a:xfrm>
           <a:prstGeom prst="rect">
             <a:avLst/>
@@ -7966,7 +8010,7 @@
         <p:spPr>
           <a:xfrm>
             <a:off x="457200" y="2057400"/>
-            <a:ext cx="4341960" cy="344880"/>
+            <a:ext cx="4341240" cy="344160"/>
           </a:xfrm>
           <a:prstGeom prst="rect">
             <a:avLst/>
@@ -7992,7 +8036,7 @@
         <p:spPr>
           <a:xfrm>
             <a:off x="457200" y="1277640"/>
-            <a:ext cx="10514160" cy="3487320"/>
+            <a:ext cx="10513440" cy="3486600"/>
           </a:xfrm>
           <a:prstGeom prst="rect">
             <a:avLst/>
@@ -8020,7 +8064,7 @@
               <a:buNone/>
             </a:pPr>
             <a:r>
-              <a:rPr b="0" lang="en-US" sz="2400" spc="-1" strike="noStrike">
+              <a:rPr b="0" lang="en-US" sz="2200" spc="-1" strike="noStrike">
                 <a:solidFill>
                   <a:srgbClr val="000000"/>
                 </a:solidFill>
@@ -8029,30 +8073,30 @@
               </a:rPr>
               <a:t>Each project should have a problem statement, but clarity may vary.</a:t>
             </a:r>
-            <a:endParaRPr b="0" lang="en-US" sz="2400" spc="-1" strike="noStrike">
-              <a:latin typeface="Arial"/>
-            </a:endParaRPr>
-          </a:p>
-          <a:p>
-            <a:pPr>
-              <a:lnSpc>
-                <a:spcPct val="100000"/>
-              </a:lnSpc>
-              <a:buNone/>
-            </a:pPr>
-            <a:endParaRPr b="0" lang="en-US" sz="2400" spc="-1" strike="noStrike">
-              <a:latin typeface="Arial"/>
-            </a:endParaRPr>
-          </a:p>
-          <a:p>
-            <a:pPr>
-              <a:lnSpc>
-                <a:spcPct val="100000"/>
-              </a:lnSpc>
-              <a:buNone/>
-            </a:pPr>
-            <a:r>
-              <a:rPr b="1" lang="en-US" sz="2400" spc="-1" strike="noStrike">
+            <a:endParaRPr b="0" lang="en-US" sz="2200" spc="-1" strike="noStrike">
+              <a:latin typeface="Arial"/>
+            </a:endParaRPr>
+          </a:p>
+          <a:p>
+            <a:pPr>
+              <a:lnSpc>
+                <a:spcPct val="100000"/>
+              </a:lnSpc>
+              <a:buNone/>
+            </a:pPr>
+            <a:endParaRPr b="0" lang="en-US" sz="2200" spc="-1" strike="noStrike">
+              <a:latin typeface="Arial"/>
+            </a:endParaRPr>
+          </a:p>
+          <a:p>
+            <a:pPr>
+              <a:lnSpc>
+                <a:spcPct val="100000"/>
+              </a:lnSpc>
+              <a:buNone/>
+            </a:pPr>
+            <a:r>
+              <a:rPr b="1" lang="en-US" sz="2200" spc="-1" strike="noStrike">
                 <a:solidFill>
                   <a:srgbClr val="000000"/>
                 </a:solidFill>
@@ -8061,30 +8105,30 @@
               </a:rPr>
               <a:t>Q: What if the sponsor doesn’t clearly define the problem?</a:t>
             </a:r>
-            <a:endParaRPr b="0" lang="en-US" sz="2400" spc="-1" strike="noStrike">
-              <a:latin typeface="Arial"/>
-            </a:endParaRPr>
-          </a:p>
-          <a:p>
-            <a:pPr>
-              <a:lnSpc>
-                <a:spcPct val="100000"/>
-              </a:lnSpc>
-              <a:buNone/>
-            </a:pPr>
-            <a:endParaRPr b="0" lang="en-US" sz="2400" spc="-1" strike="noStrike">
-              <a:latin typeface="Arial"/>
-            </a:endParaRPr>
-          </a:p>
-          <a:p>
-            <a:pPr>
-              <a:lnSpc>
-                <a:spcPct val="100000"/>
-              </a:lnSpc>
-              <a:buNone/>
-            </a:pPr>
-            <a:r>
-              <a:rPr b="0" lang="en-US" sz="2400" spc="-1" strike="noStrike">
+            <a:endParaRPr b="0" lang="en-US" sz="2200" spc="-1" strike="noStrike">
+              <a:latin typeface="Arial"/>
+            </a:endParaRPr>
+          </a:p>
+          <a:p>
+            <a:pPr>
+              <a:lnSpc>
+                <a:spcPct val="100000"/>
+              </a:lnSpc>
+              <a:buNone/>
+            </a:pPr>
+            <a:endParaRPr b="0" lang="en-US" sz="2200" spc="-1" strike="noStrike">
+              <a:latin typeface="Arial"/>
+            </a:endParaRPr>
+          </a:p>
+          <a:p>
+            <a:pPr>
+              <a:lnSpc>
+                <a:spcPct val="100000"/>
+              </a:lnSpc>
+              <a:buNone/>
+            </a:pPr>
+            <a:r>
+              <a:rPr b="0" lang="en-US" sz="2200" spc="-1" strike="noStrike">
                 <a:solidFill>
                   <a:srgbClr val="000000"/>
                 </a:solidFill>
@@ -8093,29 +8137,29 @@
               </a:rPr>
               <a:t>You might propose ideas at intersection of what’s achievable &amp; interesting</a:t>
             </a:r>
-            <a:endParaRPr b="0" lang="en-US" sz="2400" spc="-1" strike="noStrike">
-              <a:latin typeface="Arial"/>
-            </a:endParaRPr>
-          </a:p>
-          <a:p>
-            <a:pPr>
-              <a:lnSpc>
-                <a:spcPct val="100000"/>
-              </a:lnSpc>
-              <a:buNone/>
-            </a:pPr>
-            <a:endParaRPr b="0" lang="en-US" sz="2400" spc="-1" strike="noStrike">
-              <a:latin typeface="Arial"/>
-            </a:endParaRPr>
-          </a:p>
-          <a:p>
-            <a:pPr>
-              <a:lnSpc>
-                <a:spcPct val="100000"/>
-              </a:lnSpc>
-              <a:buNone/>
-            </a:pPr>
-            <a:endParaRPr b="0" lang="en-US" sz="2400" spc="-1" strike="noStrike">
+            <a:endParaRPr b="0" lang="en-US" sz="2200" spc="-1" strike="noStrike">
+              <a:latin typeface="Arial"/>
+            </a:endParaRPr>
+          </a:p>
+          <a:p>
+            <a:pPr>
+              <a:lnSpc>
+                <a:spcPct val="100000"/>
+              </a:lnSpc>
+              <a:buNone/>
+            </a:pPr>
+            <a:endParaRPr b="0" lang="en-US" sz="2200" spc="-1" strike="noStrike">
+              <a:latin typeface="Arial"/>
+            </a:endParaRPr>
+          </a:p>
+          <a:p>
+            <a:pPr>
+              <a:lnSpc>
+                <a:spcPct val="100000"/>
+              </a:lnSpc>
+              <a:buNone/>
+            </a:pPr>
+            <a:endParaRPr b="0" lang="en-US" sz="2200" spc="-1" strike="noStrike">
               <a:latin typeface="Arial"/>
             </a:endParaRPr>
           </a:p>
@@ -8160,7 +8204,7 @@
         <p:spPr>
           <a:xfrm>
             <a:off x="428760" y="71640"/>
-            <a:ext cx="10086480" cy="540720"/>
+            <a:ext cx="10085760" cy="540000"/>
           </a:xfrm>
           <a:prstGeom prst="rect">
             <a:avLst/>
@@ -8212,7 +8256,7 @@
         <p:spPr>
           <a:xfrm>
             <a:off x="457200" y="2057400"/>
-            <a:ext cx="4341960" cy="344880"/>
+            <a:ext cx="4341240" cy="344160"/>
           </a:xfrm>
           <a:prstGeom prst="rect">
             <a:avLst/>
@@ -8238,7 +8282,7 @@
         <p:spPr>
           <a:xfrm>
             <a:off x="457200" y="1277640"/>
-            <a:ext cx="10514160" cy="3487320"/>
+            <a:ext cx="10513440" cy="3486600"/>
           </a:xfrm>
           <a:prstGeom prst="rect">
             <a:avLst/>
@@ -8503,7 +8547,7 @@
         <p:spPr>
           <a:xfrm>
             <a:off x="428760" y="71640"/>
-            <a:ext cx="10086480" cy="540720"/>
+            <a:ext cx="10085760" cy="540000"/>
           </a:xfrm>
           <a:prstGeom prst="rect">
             <a:avLst/>
@@ -8555,7 +8599,7 @@
         <p:spPr>
           <a:xfrm>
             <a:off x="457200" y="2057400"/>
-            <a:ext cx="4341960" cy="344880"/>
+            <a:ext cx="4341240" cy="344160"/>
           </a:xfrm>
           <a:prstGeom prst="rect">
             <a:avLst/>
@@ -8581,7 +8625,7 @@
         <p:spPr>
           <a:xfrm>
             <a:off x="457200" y="1277640"/>
-            <a:ext cx="10514160" cy="3487320"/>
+            <a:ext cx="10513440" cy="3486600"/>
           </a:xfrm>
           <a:prstGeom prst="rect">
             <a:avLst/>

</xml_diff>